<commit_message>
Update Datapalooza 2 - DataVizStage - 20240103 - Visualización datos con Shiny.pptx
</commit_message>
<xml_diff>
--- a/slides/Datapalooza 2 - DataVizStage - 20240103 - Visualización datos con Shiny.pptx
+++ b/slides/Datapalooza 2 - DataVizStage - 20240103 - Visualización datos con Shiny.pptx
@@ -6055,9 +6055,26 @@
                   <a:srgbClr val="000000"/>
                 </a:solidFill>
                 <a:latin typeface="Fira Sans" panose="020B0503050000020004" pitchFamily="34" charset="0"/>
-              </a:rPr>
-              <a:t>https://jbkunst.shinyapps.io/cegir-smartdata-dashboard/</a:t>
-            </a:r>
+                <a:hlinkClick r:id="rId6"/>
+              </a:rPr>
+              <a:t>https://jbkunst.shinyapps.io/</a:t>
+            </a:r>
+            <a:r>
+              <a:rPr lang="es-ES" sz="2000">
+                <a:solidFill>
+                  <a:srgbClr val="000000"/>
+                </a:solidFill>
+                <a:latin typeface="Fira Sans" panose="020B0503050000020004" pitchFamily="34" charset="0"/>
+                <a:hlinkClick r:id="rId6"/>
+              </a:rPr>
+              <a:t>cegir-smartdata-dashboard/</a:t>
+            </a:r>
+            <a:endParaRPr lang="es-ES" sz="2000" dirty="0">
+              <a:solidFill>
+                <a:srgbClr val="000000"/>
+              </a:solidFill>
+              <a:latin typeface="Fira Sans" panose="020B0503050000020004" pitchFamily="34" charset="0"/>
+            </a:endParaRPr>
           </a:p>
           <a:p>
             <a:pPr marL="342900" indent="-342900">
@@ -6131,7 +6148,7 @@
           <p:nvPr/>
         </p:nvPicPr>
         <p:blipFill>
-          <a:blip r:embed="rId6"/>
+          <a:blip r:embed="rId7"/>
           <a:stretch>
             <a:fillRect/>
           </a:stretch>
@@ -6168,7 +6185,7 @@
           <p:nvPr/>
         </p:nvPicPr>
         <p:blipFill>
-          <a:blip r:embed="rId7"/>
+          <a:blip r:embed="rId8"/>
           <a:stretch>
             <a:fillRect/>
           </a:stretch>
@@ -37360,7 +37377,7 @@
         <p:spPr>
           <a:xfrm>
             <a:off x="1981200" y="1725065"/>
-            <a:ext cx="7992148" cy="4101123"/>
+            <a:ext cx="7992148" cy="5024452"/>
           </a:xfrm>
           <a:prstGeom prst="rect">
             <a:avLst/>
@@ -37412,7 +37429,23 @@
                 <a:ea typeface="Source Sans Pro" panose="020B0503030403020204" pitchFamily="34" charset="0"/>
                 <a:cs typeface="Fira Code" pitchFamily="1" charset="0"/>
               </a:rPr>
-              <a:t>Agregar estilos (por ejemplo, corporativos) a una aplicación y que los gráficos expresen el mismo lenguaje visual.</a:t>
+              <a:t>Agregar estilos (por ejemplo, corporativos) a una aplicación y que los gráficos expresen el mismo lenguaje visual. Paquete </a:t>
+            </a:r>
+            <a:r>
+              <a:rPr lang="es-ES" sz="2000" dirty="0" err="1">
+                <a:latin typeface="Source Sans Pro" panose="020B0503030403020204" pitchFamily="34" charset="0"/>
+                <a:ea typeface="Source Sans Pro" panose="020B0503030403020204" pitchFamily="34" charset="0"/>
+                <a:cs typeface="Fira Code" pitchFamily="1" charset="0"/>
+              </a:rPr>
+              <a:t>bslib</a:t>
+            </a:r>
+            <a:r>
+              <a:rPr lang="es-ES" sz="2000" dirty="0">
+                <a:latin typeface="Source Sans Pro" panose="020B0503030403020204" pitchFamily="34" charset="0"/>
+                <a:ea typeface="Source Sans Pro" panose="020B0503030403020204" pitchFamily="34" charset="0"/>
+                <a:cs typeface="Fira Code" pitchFamily="1" charset="0"/>
+              </a:rPr>
+              <a:t>!</a:t>
             </a:r>
           </a:p>
           <a:p>
@@ -37423,14 +37456,11 @@
               <a:buFont typeface="+mj-lt"/>
               <a:buAutoNum type="arabicPeriod"/>
             </a:pPr>
-            <a:r>
-              <a:rPr lang="es-ES" sz="2000" dirty="0">
-                <a:latin typeface="Source Sans Pro" panose="020B0503030403020204" pitchFamily="34" charset="0"/>
-                <a:ea typeface="Source Sans Pro" panose="020B0503030403020204" pitchFamily="34" charset="0"/>
-                <a:cs typeface="Fira Code" pitchFamily="1" charset="0"/>
-              </a:rPr>
-              <a:t>Optimizar respuesta de la aplicación, en términos de tiempos y procesos.</a:t>
-            </a:r>
+            <a:endParaRPr lang="es-ES" sz="2000" dirty="0">
+              <a:latin typeface="Source Sans Pro" panose="020B0503030403020204" pitchFamily="34" charset="0"/>
+              <a:ea typeface="Source Sans Pro" panose="020B0503030403020204" pitchFamily="34" charset="0"/>
+              <a:cs typeface="Fira Code" pitchFamily="1" charset="0"/>
+            </a:endParaRPr>
           </a:p>
           <a:p>
             <a:pPr marL="342900" indent="-342900">
@@ -37446,7 +37476,54 @@
                 <a:ea typeface="Source Sans Pro" panose="020B0503030403020204" pitchFamily="34" charset="0"/>
                 <a:cs typeface="Fira Code" pitchFamily="1" charset="0"/>
               </a:rPr>
-              <a:t>¡Hacer tu aplicación todavía más interactiva!</a:t>
+              <a:t>Optimizar respuesta de la aplicación, en términos de tiempos y procesos. Reactividad avanzada, </a:t>
+            </a:r>
+            <a:r>
+              <a:rPr lang="es-ES" sz="2000" dirty="0" err="1">
+                <a:latin typeface="Source Sans Pro" panose="020B0503030403020204" pitchFamily="34" charset="0"/>
+                <a:ea typeface="Source Sans Pro" panose="020B0503030403020204" pitchFamily="34" charset="0"/>
+                <a:cs typeface="Fira Code" pitchFamily="1" charset="0"/>
+              </a:rPr>
+              <a:t>observers</a:t>
+            </a:r>
+            <a:r>
+              <a:rPr lang="es-ES" sz="2000" dirty="0">
+                <a:latin typeface="Source Sans Pro" panose="020B0503030403020204" pitchFamily="34" charset="0"/>
+                <a:ea typeface="Source Sans Pro" panose="020B0503030403020204" pitchFamily="34" charset="0"/>
+                <a:cs typeface="Fira Code" pitchFamily="1" charset="0"/>
+              </a:rPr>
+              <a:t>, eventos, caché.</a:t>
+            </a:r>
+          </a:p>
+          <a:p>
+            <a:pPr marL="342900" indent="-342900">
+              <a:spcAft>
+                <a:spcPts val="1200"/>
+              </a:spcAft>
+              <a:buFont typeface="+mj-lt"/>
+              <a:buAutoNum type="arabicPeriod"/>
+            </a:pPr>
+            <a:endParaRPr lang="es-ES" sz="2000" dirty="0">
+              <a:latin typeface="Source Sans Pro" panose="020B0503030403020204" pitchFamily="34" charset="0"/>
+              <a:ea typeface="Source Sans Pro" panose="020B0503030403020204" pitchFamily="34" charset="0"/>
+              <a:cs typeface="Fira Code" pitchFamily="1" charset="0"/>
+            </a:endParaRPr>
+          </a:p>
+          <a:p>
+            <a:pPr marL="342900" indent="-342900">
+              <a:spcAft>
+                <a:spcPts val="1200"/>
+              </a:spcAft>
+              <a:buFont typeface="+mj-lt"/>
+              <a:buAutoNum type="arabicPeriod"/>
+            </a:pPr>
+            <a:r>
+              <a:rPr lang="es-ES" sz="2000" dirty="0">
+                <a:latin typeface="Source Sans Pro" panose="020B0503030403020204" pitchFamily="34" charset="0"/>
+                <a:ea typeface="Source Sans Pro" panose="020B0503030403020204" pitchFamily="34" charset="0"/>
+                <a:cs typeface="Fira Code" pitchFamily="1" charset="0"/>
+              </a:rPr>
+              <a:t>¡Hacer tu aplicación todavía más interactiva! </a:t>
             </a:r>
           </a:p>
           <a:p>

</xml_diff>